<commit_message>
functional view + concurency view
</commit_message>
<xml_diff>
--- a/ThesisWork/plug-in/layers/layers.pptx
+++ b/ThesisWork/plug-in/layers/layers.pptx
@@ -289,7 +289,7 @@
             <a:fld id="{1D8BD707-D9CF-40AE-B4C6-C98DA3205C09}" type="datetimeFigureOut">
               <a:rPr lang="en-US" smtClean="0"/>
               <a:pPr/>
-              <a:t>2/1/2013</a:t>
+              <a:t>2/4/2013</a:t>
             </a:fld>
             <a:endParaRPr lang="en-US"/>
           </a:p>
@@ -456,7 +456,7 @@
             <a:fld id="{1D8BD707-D9CF-40AE-B4C6-C98DA3205C09}" type="datetimeFigureOut">
               <a:rPr lang="en-US" smtClean="0"/>
               <a:pPr/>
-              <a:t>2/1/2013</a:t>
+              <a:t>2/4/2013</a:t>
             </a:fld>
             <a:endParaRPr lang="en-US"/>
           </a:p>
@@ -633,7 +633,7 @@
             <a:fld id="{1D8BD707-D9CF-40AE-B4C6-C98DA3205C09}" type="datetimeFigureOut">
               <a:rPr lang="en-US" smtClean="0"/>
               <a:pPr/>
-              <a:t>2/1/2013</a:t>
+              <a:t>2/4/2013</a:t>
             </a:fld>
             <a:endParaRPr lang="en-US"/>
           </a:p>
@@ -800,7 +800,7 @@
             <a:fld id="{1D8BD707-D9CF-40AE-B4C6-C98DA3205C09}" type="datetimeFigureOut">
               <a:rPr lang="en-US" smtClean="0"/>
               <a:pPr/>
-              <a:t>2/1/2013</a:t>
+              <a:t>2/4/2013</a:t>
             </a:fld>
             <a:endParaRPr lang="en-US"/>
           </a:p>
@@ -1043,7 +1043,7 @@
             <a:fld id="{1D8BD707-D9CF-40AE-B4C6-C98DA3205C09}" type="datetimeFigureOut">
               <a:rPr lang="en-US" smtClean="0"/>
               <a:pPr/>
-              <a:t>2/1/2013</a:t>
+              <a:t>2/4/2013</a:t>
             </a:fld>
             <a:endParaRPr lang="en-US"/>
           </a:p>
@@ -1328,7 +1328,7 @@
             <a:fld id="{1D8BD707-D9CF-40AE-B4C6-C98DA3205C09}" type="datetimeFigureOut">
               <a:rPr lang="en-US" smtClean="0"/>
               <a:pPr/>
-              <a:t>2/1/2013</a:t>
+              <a:t>2/4/2013</a:t>
             </a:fld>
             <a:endParaRPr lang="en-US"/>
           </a:p>
@@ -1747,7 +1747,7 @@
             <a:fld id="{1D8BD707-D9CF-40AE-B4C6-C98DA3205C09}" type="datetimeFigureOut">
               <a:rPr lang="en-US" smtClean="0"/>
               <a:pPr/>
-              <a:t>2/1/2013</a:t>
+              <a:t>2/4/2013</a:t>
             </a:fld>
             <a:endParaRPr lang="en-US"/>
           </a:p>
@@ -1862,7 +1862,7 @@
             <a:fld id="{1D8BD707-D9CF-40AE-B4C6-C98DA3205C09}" type="datetimeFigureOut">
               <a:rPr lang="en-US" smtClean="0"/>
               <a:pPr/>
-              <a:t>2/1/2013</a:t>
+              <a:t>2/4/2013</a:t>
             </a:fld>
             <a:endParaRPr lang="en-US"/>
           </a:p>
@@ -1954,7 +1954,7 @@
             <a:fld id="{1D8BD707-D9CF-40AE-B4C6-C98DA3205C09}" type="datetimeFigureOut">
               <a:rPr lang="en-US" smtClean="0"/>
               <a:pPr/>
-              <a:t>2/1/2013</a:t>
+              <a:t>2/4/2013</a:t>
             </a:fld>
             <a:endParaRPr lang="en-US"/>
           </a:p>
@@ -2228,7 +2228,7 @@
             <a:fld id="{1D8BD707-D9CF-40AE-B4C6-C98DA3205C09}" type="datetimeFigureOut">
               <a:rPr lang="en-US" smtClean="0"/>
               <a:pPr/>
-              <a:t>2/1/2013</a:t>
+              <a:t>2/4/2013</a:t>
             </a:fld>
             <a:endParaRPr lang="en-US"/>
           </a:p>
@@ -2478,7 +2478,7 @@
             <a:fld id="{1D8BD707-D9CF-40AE-B4C6-C98DA3205C09}" type="datetimeFigureOut">
               <a:rPr lang="en-US" smtClean="0"/>
               <a:pPr/>
-              <a:t>2/1/2013</a:t>
+              <a:t>2/4/2013</a:t>
             </a:fld>
             <a:endParaRPr lang="en-US"/>
           </a:p>
@@ -2688,7 +2688,7 @@
             <a:fld id="{1D8BD707-D9CF-40AE-B4C6-C98DA3205C09}" type="datetimeFigureOut">
               <a:rPr lang="en-US" smtClean="0"/>
               <a:pPr/>
-              <a:t>2/1/2013</a:t>
+              <a:t>2/4/2013</a:t>
             </a:fld>
             <a:endParaRPr lang="en-US"/>
           </a:p>
@@ -3067,7 +3067,7 @@
         </p:nvSpPr>
         <p:spPr>
           <a:xfrm>
-            <a:off x="1981200" y="4419600"/>
+            <a:off x="1981200" y="4343400"/>
             <a:ext cx="5181600" cy="609600"/>
           </a:xfrm>
           <a:prstGeom prst="roundRect">
@@ -3095,7 +3095,7 @@
             <a:pPr algn="ctr"/>
             <a:r>
               <a:rPr lang="en-US" dirty="0" smtClean="0"/>
-              <a:t>Java</a:t>
+              <a:t>Plug-in storage layer </a:t>
             </a:r>
             <a:endParaRPr lang="en-US" dirty="0"/>
           </a:p>
@@ -3118,13 +3118,13 @@
         </p:spPr>
         <p:style>
           <a:lnRef idx="1">
-            <a:schemeClr val="accent3"/>
+            <a:schemeClr val="accent6"/>
           </a:lnRef>
           <a:fillRef idx="3">
-            <a:schemeClr val="accent3"/>
+            <a:schemeClr val="accent6"/>
           </a:fillRef>
           <a:effectRef idx="2">
-            <a:schemeClr val="accent3"/>
+            <a:schemeClr val="accent6"/>
           </a:effectRef>
           <a:fontRef idx="minor">
             <a:schemeClr val="lt1"/>
@@ -3137,7 +3137,7 @@
             <a:pPr algn="ctr"/>
             <a:r>
               <a:rPr lang="en-US" dirty="0" smtClean="0"/>
-              <a:t>OSGI</a:t>
+              <a:t>Plug-in access layer</a:t>
             </a:r>
             <a:endParaRPr lang="en-US" dirty="0"/>
           </a:p>
@@ -3151,7 +3151,7 @@
         </p:nvSpPr>
         <p:spPr>
           <a:xfrm>
-            <a:off x="1981200" y="2895600"/>
+            <a:off x="1981200" y="2971800"/>
             <a:ext cx="5181600" cy="609600"/>
           </a:xfrm>
           <a:prstGeom prst="roundRect">
@@ -3179,91 +3179,7 @@
             <a:pPr algn="ctr"/>
             <a:r>
               <a:rPr lang="en-US" dirty="0" smtClean="0"/>
-              <a:t>Component access layer</a:t>
-            </a:r>
-            <a:endParaRPr lang="en-US" dirty="0"/>
-          </a:p>
-        </p:txBody>
-      </p:sp>
-      <p:sp>
-        <p:nvSpPr>
-          <p:cNvPr id="9" name="Rounded Rectangle 8"/>
-          <p:cNvSpPr/>
-          <p:nvPr/>
-        </p:nvSpPr>
-        <p:spPr>
-          <a:xfrm>
-            <a:off x="1981200" y="2133600"/>
-            <a:ext cx="2590800" cy="609600"/>
-          </a:xfrm>
-          <a:prstGeom prst="roundRect">
-            <a:avLst/>
-          </a:prstGeom>
-        </p:spPr>
-        <p:style>
-          <a:lnRef idx="1">
-            <a:schemeClr val="accent6"/>
-          </a:lnRef>
-          <a:fillRef idx="3">
-            <a:schemeClr val="accent6"/>
-          </a:fillRef>
-          <a:effectRef idx="2">
-            <a:schemeClr val="accent6"/>
-          </a:effectRef>
-          <a:fontRef idx="minor">
-            <a:schemeClr val="lt1"/>
-          </a:fontRef>
-        </p:style>
-        <p:txBody>
-          <a:bodyPr rtlCol="0" anchor="ctr"/>
-          <a:lstStyle/>
-          <a:p>
-            <a:pPr algn="ctr"/>
-            <a:r>
-              <a:rPr lang="en-US" dirty="0" smtClean="0"/>
-              <a:t>Workflow engine</a:t>
-            </a:r>
-            <a:endParaRPr lang="en-US" dirty="0"/>
-          </a:p>
-        </p:txBody>
-      </p:sp>
-      <p:sp>
-        <p:nvSpPr>
-          <p:cNvPr id="10" name="Rounded Rectangle 9"/>
-          <p:cNvSpPr/>
-          <p:nvPr/>
-        </p:nvSpPr>
-        <p:spPr>
-          <a:xfrm>
-            <a:off x="4648200" y="2133600"/>
-            <a:ext cx="2514600" cy="609600"/>
-          </a:xfrm>
-          <a:prstGeom prst="roundRect">
-            <a:avLst/>
-          </a:prstGeom>
-        </p:spPr>
-        <p:style>
-          <a:lnRef idx="1">
-            <a:schemeClr val="accent5"/>
-          </a:lnRef>
-          <a:fillRef idx="3">
-            <a:schemeClr val="accent5"/>
-          </a:fillRef>
-          <a:effectRef idx="2">
-            <a:schemeClr val="accent5"/>
-          </a:effectRef>
-          <a:fontRef idx="minor">
-            <a:schemeClr val="lt1"/>
-          </a:fontRef>
-        </p:style>
-        <p:txBody>
-          <a:bodyPr rtlCol="0" anchor="ctr"/>
-          <a:lstStyle/>
-          <a:p>
-            <a:pPr algn="ctr"/>
-            <a:r>
-              <a:rPr lang="en-US" dirty="0" smtClean="0"/>
-              <a:t>Plug-in Admin.</a:t>
+              <a:t>Application layer</a:t>
             </a:r>
             <a:endParaRPr lang="en-US" dirty="0"/>
           </a:p>

</xml_diff>